<commit_message>
Updated Figures with text alignments, capitals...
</commit_message>
<xml_diff>
--- a/Figures/Fig2-Sequence.pptx
+++ b/Figures/Fig2-Sequence.pptx
@@ -243,7 +243,7 @@
           <a:p>
             <a:fld id="{F6E67D99-BCE2-4351-9BAF-145DC8638001}" type="datetimeFigureOut">
               <a:rPr lang="en-US" smtClean="0"/>
-              <a:t>6/11/2021</a:t>
+              <a:t>6/24/2021</a:t>
             </a:fld>
             <a:endParaRPr lang="en-US"/>
           </a:p>
@@ -413,7 +413,7 @@
           <a:p>
             <a:fld id="{F6E67D99-BCE2-4351-9BAF-145DC8638001}" type="datetimeFigureOut">
               <a:rPr lang="en-US" smtClean="0"/>
-              <a:t>6/11/2021</a:t>
+              <a:t>6/24/2021</a:t>
             </a:fld>
             <a:endParaRPr lang="en-US"/>
           </a:p>
@@ -593,7 +593,7 @@
           <a:p>
             <a:fld id="{F6E67D99-BCE2-4351-9BAF-145DC8638001}" type="datetimeFigureOut">
               <a:rPr lang="en-US" smtClean="0"/>
-              <a:t>6/11/2021</a:t>
+              <a:t>6/24/2021</a:t>
             </a:fld>
             <a:endParaRPr lang="en-US"/>
           </a:p>
@@ -763,7 +763,7 @@
           <a:p>
             <a:fld id="{F6E67D99-BCE2-4351-9BAF-145DC8638001}" type="datetimeFigureOut">
               <a:rPr lang="en-US" smtClean="0"/>
-              <a:t>6/11/2021</a:t>
+              <a:t>6/24/2021</a:t>
             </a:fld>
             <a:endParaRPr lang="en-US"/>
           </a:p>
@@ -1009,7 +1009,7 @@
           <a:p>
             <a:fld id="{F6E67D99-BCE2-4351-9BAF-145DC8638001}" type="datetimeFigureOut">
               <a:rPr lang="en-US" smtClean="0"/>
-              <a:t>6/11/2021</a:t>
+              <a:t>6/24/2021</a:t>
             </a:fld>
             <a:endParaRPr lang="en-US"/>
           </a:p>
@@ -1241,7 +1241,7 @@
           <a:p>
             <a:fld id="{F6E67D99-BCE2-4351-9BAF-145DC8638001}" type="datetimeFigureOut">
               <a:rPr lang="en-US" smtClean="0"/>
-              <a:t>6/11/2021</a:t>
+              <a:t>6/24/2021</a:t>
             </a:fld>
             <a:endParaRPr lang="en-US"/>
           </a:p>
@@ -1608,7 +1608,7 @@
           <a:p>
             <a:fld id="{F6E67D99-BCE2-4351-9BAF-145DC8638001}" type="datetimeFigureOut">
               <a:rPr lang="en-US" smtClean="0"/>
-              <a:t>6/11/2021</a:t>
+              <a:t>6/24/2021</a:t>
             </a:fld>
             <a:endParaRPr lang="en-US"/>
           </a:p>
@@ -1726,7 +1726,7 @@
           <a:p>
             <a:fld id="{F6E67D99-BCE2-4351-9BAF-145DC8638001}" type="datetimeFigureOut">
               <a:rPr lang="en-US" smtClean="0"/>
-              <a:t>6/11/2021</a:t>
+              <a:t>6/24/2021</a:t>
             </a:fld>
             <a:endParaRPr lang="en-US"/>
           </a:p>
@@ -1821,7 +1821,7 @@
           <a:p>
             <a:fld id="{F6E67D99-BCE2-4351-9BAF-145DC8638001}" type="datetimeFigureOut">
               <a:rPr lang="en-US" smtClean="0"/>
-              <a:t>6/11/2021</a:t>
+              <a:t>6/24/2021</a:t>
             </a:fld>
             <a:endParaRPr lang="en-US"/>
           </a:p>
@@ -2098,7 +2098,7 @@
           <a:p>
             <a:fld id="{F6E67D99-BCE2-4351-9BAF-145DC8638001}" type="datetimeFigureOut">
               <a:rPr lang="en-US" smtClean="0"/>
-              <a:t>6/11/2021</a:t>
+              <a:t>6/24/2021</a:t>
             </a:fld>
             <a:endParaRPr lang="en-US"/>
           </a:p>
@@ -2351,7 +2351,7 @@
           <a:p>
             <a:fld id="{F6E67D99-BCE2-4351-9BAF-145DC8638001}" type="datetimeFigureOut">
               <a:rPr lang="en-US" smtClean="0"/>
-              <a:t>6/11/2021</a:t>
+              <a:t>6/24/2021</a:t>
             </a:fld>
             <a:endParaRPr lang="en-US"/>
           </a:p>
@@ -2564,7 +2564,7 @@
           <a:p>
             <a:fld id="{F6E67D99-BCE2-4351-9BAF-145DC8638001}" type="datetimeFigureOut">
               <a:rPr lang="en-US" smtClean="0"/>
-              <a:t>6/11/2021</a:t>
+              <a:t>6/24/2021</a:t>
             </a:fld>
             <a:endParaRPr lang="en-US"/>
           </a:p>
@@ -2977,8 +2977,8 @@
         </p:nvSpPr>
         <p:spPr>
           <a:xfrm>
-            <a:off x="2253546" y="124241"/>
-            <a:ext cx="616503" cy="7692007"/>
+            <a:off x="2264906" y="-80155"/>
+            <a:ext cx="616503" cy="8077257"/>
           </a:xfrm>
           <a:prstGeom prst="rect">
             <a:avLst/>
@@ -2990,9 +2990,8 @@
           </a:solidFill>
           <a:ln>
             <a:solidFill>
-              <a:schemeClr val="tx2">
-                <a:lumMod val="60000"/>
-                <a:lumOff val="40000"/>
+              <a:schemeClr val="bg2">
+                <a:lumMod val="75000"/>
               </a:schemeClr>
             </a:solidFill>
           </a:ln>
@@ -3030,8 +3029,8 @@
         </p:nvSpPr>
         <p:spPr>
           <a:xfrm>
-            <a:off x="2901763" y="3521340"/>
-            <a:ext cx="5924185" cy="1082425"/>
+            <a:off x="2892239" y="3470593"/>
+            <a:ext cx="6165898" cy="1157279"/>
           </a:xfrm>
           <a:prstGeom prst="rect">
             <a:avLst/>
@@ -3041,6 +3040,13 @@
               <a:lumMod val="90000"/>
             </a:schemeClr>
           </a:solidFill>
+          <a:ln>
+            <a:solidFill>
+              <a:schemeClr val="bg2">
+                <a:lumMod val="75000"/>
+              </a:schemeClr>
+            </a:solidFill>
+          </a:ln>
         </p:spPr>
         <p:style>
           <a:lnRef idx="2">
@@ -3075,8 +3081,8 @@
         </p:nvSpPr>
         <p:spPr>
           <a:xfrm>
-            <a:off x="2901764" y="4663071"/>
-            <a:ext cx="5924184" cy="1027175"/>
+            <a:off x="2893525" y="4642186"/>
+            <a:ext cx="6164611" cy="1291906"/>
           </a:xfrm>
           <a:prstGeom prst="rect">
             <a:avLst/>
@@ -3086,6 +3092,13 @@
               <a:lumMod val="90000"/>
             </a:schemeClr>
           </a:solidFill>
+          <a:ln>
+            <a:solidFill>
+              <a:schemeClr val="bg2">
+                <a:lumMod val="75000"/>
+              </a:schemeClr>
+            </a:solidFill>
+          </a:ln>
         </p:spPr>
         <p:style>
           <a:lnRef idx="2">
@@ -3120,8 +3133,8 @@
         </p:nvSpPr>
         <p:spPr>
           <a:xfrm>
-            <a:off x="2899112" y="5726452"/>
-            <a:ext cx="5924185" cy="1103516"/>
+            <a:off x="2889154" y="5946652"/>
+            <a:ext cx="6185234" cy="1103516"/>
           </a:xfrm>
           <a:prstGeom prst="rect">
             <a:avLst/>
@@ -3131,6 +3144,13 @@
               <a:lumMod val="90000"/>
             </a:schemeClr>
           </a:solidFill>
+          <a:ln>
+            <a:solidFill>
+              <a:schemeClr val="bg2">
+                <a:lumMod val="75000"/>
+              </a:schemeClr>
+            </a:solidFill>
+          </a:ln>
         </p:spPr>
         <p:style>
           <a:lnRef idx="2">
@@ -3165,8 +3185,8 @@
         </p:nvSpPr>
         <p:spPr>
           <a:xfrm>
-            <a:off x="2901763" y="2367117"/>
-            <a:ext cx="5924185" cy="1099677"/>
+            <a:off x="2884484" y="2145797"/>
+            <a:ext cx="6179332" cy="1304771"/>
           </a:xfrm>
           <a:prstGeom prst="rect">
             <a:avLst/>
@@ -3176,6 +3196,13 @@
               <a:lumMod val="90000"/>
             </a:schemeClr>
           </a:solidFill>
+          <a:ln>
+            <a:solidFill>
+              <a:schemeClr val="bg2">
+                <a:lumMod val="75000"/>
+              </a:schemeClr>
+            </a:solidFill>
+          </a:ln>
         </p:spPr>
         <p:style>
           <a:lnRef idx="2">
@@ -3210,8 +3237,8 @@
         </p:nvSpPr>
         <p:spPr>
           <a:xfrm>
-            <a:off x="2900623" y="1217088"/>
-            <a:ext cx="5916616" cy="1100208"/>
+            <a:off x="2883966" y="864662"/>
+            <a:ext cx="6188087" cy="1257655"/>
           </a:xfrm>
           <a:prstGeom prst="rect">
             <a:avLst/>
@@ -3221,6 +3248,13 @@
               <a:lumMod val="90000"/>
             </a:schemeClr>
           </a:solidFill>
+          <a:ln>
+            <a:solidFill>
+              <a:schemeClr val="bg2">
+                <a:lumMod val="75000"/>
+              </a:schemeClr>
+            </a:solidFill>
+          </a:ln>
         </p:spPr>
         <p:style>
           <a:lnRef idx="2">
@@ -3255,8 +3289,8 @@
         </p:nvSpPr>
         <p:spPr>
           <a:xfrm>
-            <a:off x="2893054" y="118453"/>
-            <a:ext cx="5924185" cy="1054953"/>
+            <a:off x="2886525" y="-80155"/>
+            <a:ext cx="6188087" cy="930503"/>
           </a:xfrm>
           <a:prstGeom prst="rect">
             <a:avLst/>
@@ -3266,6 +3300,13 @@
               <a:lumMod val="90000"/>
             </a:schemeClr>
           </a:solidFill>
+          <a:ln>
+            <a:solidFill>
+              <a:schemeClr val="bg2">
+                <a:lumMod val="75000"/>
+              </a:schemeClr>
+            </a:solidFill>
+          </a:ln>
         </p:spPr>
         <p:style>
           <a:lnRef idx="2">
@@ -3300,7 +3341,7 @@
         </p:nvSpPr>
         <p:spPr>
           <a:xfrm>
-            <a:off x="2957608" y="1414616"/>
+            <a:off x="2957608" y="1166966"/>
             <a:ext cx="2073018" cy="646331"/>
           </a:xfrm>
           <a:prstGeom prst="rect">
@@ -3379,7 +3420,7 @@
         </p:nvSpPr>
         <p:spPr>
           <a:xfrm>
-            <a:off x="2932053" y="4895831"/>
+            <a:off x="2932053" y="4900979"/>
             <a:ext cx="2132653" cy="646331"/>
           </a:xfrm>
           <a:prstGeom prst="rect">
@@ -3415,7 +3456,7 @@
         </p:nvSpPr>
         <p:spPr>
           <a:xfrm>
-            <a:off x="2926373" y="6062608"/>
+            <a:off x="2926373" y="6100708"/>
             <a:ext cx="2132653" cy="646331"/>
           </a:xfrm>
           <a:prstGeom prst="rect">
@@ -3437,7 +3478,7 @@
             <a:pPr algn="ctr"/>
             <a:r>
               <a:rPr lang="en-US" smtClean="0"/>
-              <a:t>6. Simulate and analyze data, results</a:t>
+              <a:t>6. Simulate and analyze data</a:t>
             </a:r>
             <a:endParaRPr lang="en-US"/>
           </a:p>
@@ -3451,7 +3492,7 @@
         </p:nvSpPr>
         <p:spPr>
           <a:xfrm>
-            <a:off x="2938086" y="2562277"/>
+            <a:off x="2938086" y="2395204"/>
             <a:ext cx="2126620" cy="646331"/>
           </a:xfrm>
           <a:prstGeom prst="rect">
@@ -3486,7 +3527,7 @@
         </p:nvSpPr>
         <p:spPr>
           <a:xfrm>
-            <a:off x="2974648" y="295395"/>
+            <a:off x="2974648" y="9645"/>
             <a:ext cx="2073019" cy="646331"/>
           </a:xfrm>
           <a:prstGeom prst="rect">
@@ -3601,8 +3642,8 @@
         </p:nvSpPr>
         <p:spPr>
           <a:xfrm>
-            <a:off x="5407770" y="271701"/>
-            <a:ext cx="2461123" cy="1136996"/>
+            <a:off x="5407770" y="-4524"/>
+            <a:ext cx="3365790" cy="1136996"/>
           </a:xfrm>
           <a:prstGeom prst="rect">
             <a:avLst/>
@@ -3647,7 +3688,7 @@
             </a:pPr>
             <a:r>
               <a:rPr lang="en-US" sz="1400" kern="1200" smtClean="0"/>
-              <a:t>Decision: Problem statement and decision</a:t>
+              <a:t>Desk review, group discussion and workshop</a:t>
             </a:r>
           </a:p>
           <a:p>
@@ -3664,10 +3705,9 @@
               <a:buChar char="••"/>
             </a:pPr>
             <a:r>
-              <a:rPr lang="en-US" sz="1400" smtClean="0"/>
-              <a:t>Decision maker: Time availability</a:t>
-            </a:r>
-            <a:endParaRPr lang="en-US" sz="1400" kern="1200" smtClean="0"/>
+              <a:rPr lang="en-US" sz="1400" kern="1200" smtClean="0"/>
+              <a:t>Identified problem statement, decision and decision-maker</a:t>
+            </a:r>
           </a:p>
           <a:p>
             <a:pPr marL="228600" lvl="1" indent="-228600" algn="l" defTabSz="1066800">
@@ -3694,8 +3734,8 @@
         </p:nvSpPr>
         <p:spPr>
           <a:xfrm>
-            <a:off x="5402801" y="1205809"/>
-            <a:ext cx="3278947" cy="1136996"/>
+            <a:off x="5402801" y="879685"/>
+            <a:ext cx="3529524" cy="1312357"/>
           </a:xfrm>
           <a:prstGeom prst="rect">
             <a:avLst/>
@@ -3726,61 +3766,6 @@
           </a:bodyPr>
           <a:lstStyle/>
           <a:p>
-            <a:pPr marL="228600" lvl="1" indent="-228600" algn="l" defTabSz="1066800">
-              <a:lnSpc>
-                <a:spcPct val="90000"/>
-              </a:lnSpc>
-              <a:spcBef>
-                <a:spcPct val="0"/>
-              </a:spcBef>
-              <a:spcAft>
-                <a:spcPct val="15000"/>
-              </a:spcAft>
-              <a:buChar char="••"/>
-            </a:pPr>
-            <a:r>
-              <a:rPr lang="en-US" sz="1400" kern="1200" smtClean="0"/>
-              <a:t>Stakeholder mapping</a:t>
-            </a:r>
-          </a:p>
-          <a:p>
-            <a:pPr marL="228600" lvl="1" indent="-228600" algn="l" defTabSz="1066800">
-              <a:lnSpc>
-                <a:spcPct val="90000"/>
-              </a:lnSpc>
-              <a:spcBef>
-                <a:spcPct val="0"/>
-              </a:spcBef>
-              <a:spcAft>
-                <a:spcPct val="15000"/>
-              </a:spcAft>
-              <a:buChar char="••"/>
-            </a:pPr>
-            <a:r>
-              <a:rPr lang="en-US" sz="1400" kern="1200" smtClean="0"/>
-              <a:t>Experiences, willingness, availability</a:t>
-            </a:r>
-          </a:p>
-          <a:p>
-            <a:pPr marL="228600" lvl="1" indent="-228600" algn="l" defTabSz="1066800">
-              <a:lnSpc>
-                <a:spcPct val="90000"/>
-              </a:lnSpc>
-              <a:spcBef>
-                <a:spcPct val="0"/>
-              </a:spcBef>
-              <a:spcAft>
-                <a:spcPct val="15000"/>
-              </a:spcAft>
-              <a:buChar char="••"/>
-            </a:pPr>
-            <a:r>
-              <a:rPr lang="en-US" sz="1400" smtClean="0"/>
-              <a:t>Representation in value chain</a:t>
-            </a:r>
-            <a:endParaRPr lang="en-US" sz="1400" kern="1200" smtClean="0"/>
-          </a:p>
-          <a:p>
             <a:pPr marL="228600" lvl="1" indent="-228600" defTabSz="1066800">
               <a:lnSpc>
                 <a:spcPct val="90000"/>
@@ -3795,11 +3780,15 @@
             </a:pPr>
             <a:r>
               <a:rPr lang="en-US" sz="1400"/>
-              <a:t>Provisional expert team, core expert </a:t>
-            </a:r>
-          </a:p>
-          <a:p>
-            <a:pPr marL="0" lvl="1" defTabSz="1066800">
+              <a:t>Desk </a:t>
+            </a:r>
+            <a:r>
+              <a:rPr lang="en-US" sz="1400" smtClean="0"/>
+              <a:t>review, workshop and group discussion  </a:t>
+            </a:r>
+          </a:p>
+          <a:p>
+            <a:pPr marL="228600" lvl="1" indent="-228600" defTabSz="1066800">
               <a:lnSpc>
                 <a:spcPct val="90000"/>
               </a:lnSpc>
@@ -3809,11 +3798,73 @@
               <a:spcAft>
                 <a:spcPct val="15000"/>
               </a:spcAft>
+              <a:buChar char="••"/>
             </a:pPr>
             <a:r>
+              <a:rPr lang="en-US" sz="1400" smtClean="0"/>
+              <a:t>List of s</a:t>
+            </a:r>
+            <a:r>
+              <a:rPr lang="en-US" sz="1400" kern="1200" smtClean="0"/>
+              <a:t>takeholders developed</a:t>
+            </a:r>
+          </a:p>
+          <a:p>
+            <a:pPr marL="228600" lvl="1" indent="-228600" defTabSz="1066800">
+              <a:lnSpc>
+                <a:spcPct val="90000"/>
+              </a:lnSpc>
+              <a:spcBef>
+                <a:spcPct val="0"/>
+              </a:spcBef>
+              <a:spcAft>
+                <a:spcPct val="15000"/>
+              </a:spcAft>
+              <a:buChar char="••"/>
+            </a:pPr>
+            <a:r>
+              <a:rPr lang="en-US" sz="1400" smtClean="0"/>
+              <a:t>Expert criteria: </a:t>
+            </a:r>
+            <a:r>
+              <a:rPr lang="en-US" sz="1400" kern="1200" smtClean="0"/>
+              <a:t>Experiences, willingness, availability, r</a:t>
+            </a:r>
+            <a:r>
+              <a:rPr lang="en-US" sz="1400" smtClean="0"/>
+              <a:t>epresentation in value chain</a:t>
+            </a:r>
+          </a:p>
+          <a:p>
+            <a:pPr marL="228600" lvl="1" indent="-228600" defTabSz="1066800">
+              <a:lnSpc>
+                <a:spcPct val="90000"/>
+              </a:lnSpc>
+              <a:spcBef>
+                <a:spcPct val="0"/>
+              </a:spcBef>
+              <a:spcAft>
+                <a:spcPct val="15000"/>
+              </a:spcAft>
+              <a:buChar char="••"/>
+            </a:pPr>
+            <a:r>
+              <a:rPr lang="en-US" sz="1400" kern="1200" smtClean="0"/>
+              <a:t>List of p</a:t>
+            </a:r>
+            <a:r>
+              <a:rPr lang="en-US" sz="1400" smtClean="0"/>
+              <a:t>rovisional </a:t>
+            </a:r>
+            <a:r>
               <a:rPr lang="en-US" sz="1400"/>
-              <a:t>      and external resource persons</a:t>
-            </a:r>
+              <a:t>expert </a:t>
+            </a:r>
+            <a:r>
+              <a:rPr lang="en-US" sz="1400" smtClean="0"/>
+              <a:t>team and resource person developed</a:t>
+            </a:r>
+            <a:endParaRPr lang="en-US" sz="1400"/>
           </a:p>
           <a:p>
             <a:pPr marL="228600" lvl="1" indent="-228600" algn="l" defTabSz="1066800">
@@ -3840,7 +3891,7 @@
         </p:nvSpPr>
         <p:spPr>
           <a:xfrm>
-            <a:off x="5419841" y="2360991"/>
+            <a:off x="5419841" y="2189541"/>
             <a:ext cx="3769879" cy="1048900"/>
           </a:xfrm>
           <a:prstGeom prst="rect">
@@ -3886,9 +3937,8 @@
             </a:pPr>
             <a:r>
               <a:rPr lang="en-US" sz="1400" kern="1200" smtClean="0"/>
-              <a:t>Context relevance</a:t>
-            </a:r>
-            <a:endParaRPr lang="en-US" sz="1400" kern="1200" dirty="0"/>
+              <a:t>Desk review, workshop </a:t>
+            </a:r>
           </a:p>
           <a:p>
             <a:pPr marL="228600" lvl="1" indent="-228600" algn="l" defTabSz="1066800">
@@ -3904,8 +3954,12 @@
               <a:buChar char="••"/>
             </a:pPr>
             <a:r>
+              <a:rPr lang="en-US" sz="1400" smtClean="0"/>
+              <a:t>Agreed intervention principles: c</a:t>
+            </a:r>
+            <a:r>
               <a:rPr lang="en-US" sz="1400" kern="1200" smtClean="0"/>
-              <a:t>Existing </a:t>
+              <a:t>ontext relevance, existing </a:t>
             </a:r>
             <a:r>
               <a:rPr lang="en-US" sz="1400" kern="1200" dirty="0" smtClean="0"/>
@@ -3914,6 +3968,54 @@
             <a:r>
               <a:rPr lang="en-US" sz="1400" kern="1200" smtClean="0"/>
               <a:t>and resources</a:t>
+            </a:r>
+          </a:p>
+          <a:p>
+            <a:pPr marL="228600" lvl="1" indent="-228600" algn="l" defTabSz="1066800">
+              <a:lnSpc>
+                <a:spcPct val="90000"/>
+              </a:lnSpc>
+              <a:spcBef>
+                <a:spcPct val="0"/>
+              </a:spcBef>
+              <a:spcAft>
+                <a:spcPct val="15000"/>
+              </a:spcAft>
+              <a:buChar char="••"/>
+            </a:pPr>
+            <a:r>
+              <a:rPr lang="en-US" sz="1400" smtClean="0"/>
+              <a:t>Identified</a:t>
+            </a:r>
+            <a:r>
+              <a:rPr lang="en-US" sz="1400" kern="1200" smtClean="0"/>
+              <a:t> b</a:t>
+            </a:r>
+            <a:r>
+              <a:rPr lang="en-US" sz="1400" smtClean="0"/>
+              <a:t>usiness </a:t>
+            </a:r>
+            <a:r>
+              <a:rPr lang="en-US" sz="1400"/>
+              <a:t>model</a:t>
+            </a:r>
+          </a:p>
+          <a:p>
+            <a:pPr marL="228600" lvl="1" indent="-228600" algn="l" defTabSz="1066800">
+              <a:lnSpc>
+                <a:spcPct val="90000"/>
+              </a:lnSpc>
+              <a:spcBef>
+                <a:spcPct val="0"/>
+              </a:spcBef>
+              <a:spcAft>
+                <a:spcPct val="15000"/>
+              </a:spcAft>
+              <a:buChar char="••"/>
+            </a:pPr>
+            <a:r>
+              <a:rPr lang="en-US" sz="1400" kern="1200" smtClean="0"/>
+              <a:t>Defined time, location, crop, analysis boundary</a:t>
             </a:r>
           </a:p>
           <a:p>
@@ -3931,57 +4033,8 @@
               <a:buChar char="••"/>
             </a:pPr>
             <a:r>
-              <a:rPr lang="en-US" sz="1400"/>
-              <a:t>Business model</a:t>
-            </a:r>
-          </a:p>
-          <a:p>
-            <a:pPr marL="228600" lvl="1" indent="-228600" algn="l" defTabSz="1066800">
-              <a:lnSpc>
-                <a:spcPct val="90000"/>
-              </a:lnSpc>
-              <a:spcBef>
-                <a:spcPct val="0"/>
-              </a:spcBef>
-              <a:spcAft>
-                <a:spcPct val="15000"/>
-              </a:spcAft>
-              <a:buChar char="••"/>
-            </a:pPr>
-            <a:r>
-              <a:rPr lang="en-US" sz="1400" kern="1200" smtClean="0"/>
-              <a:t>Scope </a:t>
-            </a:r>
-            <a:r>
-              <a:rPr lang="en-US" sz="1400" kern="1200" dirty="0" smtClean="0"/>
-              <a:t>(time, geography</a:t>
-            </a:r>
-            <a:r>
-              <a:rPr lang="en-US" sz="1400" kern="1200" smtClean="0"/>
-              <a:t>, crops, analysis )</a:t>
-            </a:r>
-          </a:p>
-          <a:p>
-            <a:pPr marL="228600" lvl="1" indent="-228600" defTabSz="1066800">
-              <a:lnSpc>
-                <a:spcPct val="90000"/>
-              </a:lnSpc>
-              <a:spcBef>
-                <a:spcPct val="0"/>
-              </a:spcBef>
-              <a:spcAft>
-                <a:spcPct val="15000"/>
-              </a:spcAft>
-              <a:buFontTx/>
-              <a:buChar char="••"/>
-            </a:pPr>
-            <a:r>
               <a:rPr lang="en-US" sz="1400" smtClean="0"/>
-              <a:t>Confirm </a:t>
-            </a:r>
-            <a:r>
-              <a:rPr lang="en-US" sz="1400"/>
-              <a:t>expert team</a:t>
+              <a:t>Confirmed list of expert team</a:t>
             </a:r>
           </a:p>
           <a:p>
@@ -4008,8 +4061,8 @@
         </p:nvSpPr>
         <p:spPr>
           <a:xfrm>
-            <a:off x="5419840" y="3517249"/>
-            <a:ext cx="2958309" cy="1048900"/>
+            <a:off x="5419840" y="3526774"/>
+            <a:ext cx="3630059" cy="1048900"/>
           </a:xfrm>
           <a:prstGeom prst="rect">
             <a:avLst/>
@@ -4055,7 +4108,7 @@
             </a:pPr>
             <a:r>
               <a:rPr lang="en-US" sz="1400" smtClean="0"/>
-              <a:t>Desk review</a:t>
+              <a:t>Desk review, group discussion and workshop</a:t>
             </a:r>
           </a:p>
           <a:p>
@@ -4074,8 +4127,17 @@
             </a:pPr>
             <a:r>
               <a:rPr lang="en-US" sz="1400" smtClean="0"/>
-              <a:t>Participatory workshop</a:t>
-            </a:r>
+              <a:t>Identified </a:t>
+            </a:r>
+            <a:r>
+              <a:rPr lang="en-US" sz="1400"/>
+              <a:t>decision </a:t>
+            </a:r>
+            <a:r>
+              <a:rPr lang="en-US" sz="1400" smtClean="0"/>
+              <a:t>impact pathway, incorporating interdisciplinary theoretical lens</a:t>
+            </a:r>
+            <a:endParaRPr lang="en-US" sz="1400"/>
           </a:p>
           <a:p>
             <a:pPr marL="228600" lvl="1" indent="-228600" defTabSz="1066800">
@@ -4092,8 +4154,16 @@
               <a:buChar char="••"/>
             </a:pPr>
             <a:r>
+              <a:rPr lang="en-US" sz="1400" smtClean="0"/>
+              <a:t>Defined </a:t>
+            </a:r>
+            <a:r>
               <a:rPr lang="en-US" sz="1400"/>
-              <a:t>Include all relevant variables</a:t>
+              <a:t>relevant </a:t>
+            </a:r>
+            <a:r>
+              <a:rPr lang="en-US" sz="1400" smtClean="0"/>
+              <a:t>variables </a:t>
             </a:r>
           </a:p>
           <a:p>
@@ -4112,35 +4182,11 @@
             </a:pPr>
             <a:r>
               <a:rPr lang="en-US" sz="1400" smtClean="0"/>
-              <a:t>Consider </a:t>
-            </a:r>
-            <a:r>
-              <a:rPr lang="en-US" sz="1400" smtClean="0"/>
-              <a:t>other analytical frameworks</a:t>
-            </a:r>
-            <a:endParaRPr lang="en-US" sz="1400"/>
-          </a:p>
-          <a:p>
-            <a:pPr marL="228600" lvl="1" indent="-228600" defTabSz="1066800">
-              <a:lnSpc>
-                <a:spcPct val="90000"/>
-              </a:lnSpc>
-              <a:spcBef>
-                <a:spcPct val="0"/>
-              </a:spcBef>
-              <a:spcAft>
-                <a:spcPct val="15000"/>
-              </a:spcAft>
-              <a:buFont typeface="Arial" panose="020B0604020202020204" pitchFamily="34" charset="0"/>
-              <a:buChar char="••"/>
-            </a:pPr>
-            <a:r>
-              <a:rPr lang="en-US" sz="1400" smtClean="0"/>
-              <a:t>Run </a:t>
+              <a:t>Model ran </a:t>
             </a:r>
             <a:r>
               <a:rPr lang="en-US" sz="1400"/>
-              <a:t>model with place holder</a:t>
+              <a:t>with place holder</a:t>
             </a:r>
           </a:p>
           <a:p>
@@ -4160,7 +4206,7 @@
         </p:nvSpPr>
         <p:spPr>
           <a:xfrm>
-            <a:off x="5433130" y="4657262"/>
+            <a:off x="5433130" y="4695362"/>
             <a:ext cx="3392818" cy="1060463"/>
           </a:xfrm>
           <a:prstGeom prst="rect">
@@ -4207,15 +4253,7 @@
             </a:pPr>
             <a:r>
               <a:rPr lang="en-US" sz="1400" smtClean="0"/>
-              <a:t>Cost</a:t>
-            </a:r>
-            <a:r>
-              <a:rPr lang="en-US" sz="1400"/>
-              <a:t>, </a:t>
-            </a:r>
-            <a:r>
-              <a:rPr lang="en-US" sz="1400" smtClean="0"/>
-              <a:t>benefit variables: calculation equations, patterns</a:t>
+              <a:t>Workshop, interview, desk review</a:t>
             </a:r>
           </a:p>
           <a:p>
@@ -4233,8 +4271,8 @@
               <a:buChar char="••"/>
             </a:pPr>
             <a:r>
-              <a:rPr lang="en-US" sz="1400"/>
-              <a:t>Calibration training</a:t>
+              <a:rPr lang="en-US" sz="1400" smtClean="0"/>
+              <a:t>Formulated calculation equations, defined variable patterns</a:t>
             </a:r>
           </a:p>
           <a:p>
@@ -4253,7 +4291,27 @@
             </a:pPr>
             <a:r>
               <a:rPr lang="en-US" sz="1400" smtClean="0"/>
-              <a:t>Data inputs: calibrated </a:t>
+              <a:t>Expert calibrated by training</a:t>
+            </a:r>
+            <a:endParaRPr lang="en-US" sz="1400"/>
+          </a:p>
+          <a:p>
+            <a:pPr marL="228600" lvl="1" indent="-228600" defTabSz="1066800">
+              <a:lnSpc>
+                <a:spcPct val="90000"/>
+              </a:lnSpc>
+              <a:spcBef>
+                <a:spcPct val="0"/>
+              </a:spcBef>
+              <a:spcAft>
+                <a:spcPct val="15000"/>
+              </a:spcAft>
+              <a:buFont typeface="Arial" panose="020B0604020202020204" pitchFamily="34" charset="0"/>
+              <a:buChar char="••"/>
+            </a:pPr>
+            <a:r>
+              <a:rPr lang="en-US" sz="1400" smtClean="0"/>
+              <a:t>Data inputed: calibrated </a:t>
             </a:r>
             <a:r>
               <a:rPr lang="en-US" sz="1400"/>
@@ -4261,11 +4319,7 @@
             </a:r>
             <a:r>
               <a:rPr lang="en-US" sz="1400" smtClean="0"/>
-              <a:t>variable </a:t>
-            </a:r>
-            <a:r>
-              <a:rPr lang="en-US" sz="1400" smtClean="0"/>
-              <a:t> </a:t>
+              <a:t>variable  </a:t>
             </a:r>
             <a:r>
               <a:rPr lang="en-US" sz="1400"/>
@@ -4273,7 +4327,7 @@
             </a:r>
             <a:r>
               <a:rPr lang="en-US" sz="1400" smtClean="0"/>
-              <a:t>distribution, secondary data</a:t>
+              <a:t>distribution</a:t>
             </a:r>
             <a:endParaRPr lang="en-US" sz="1400"/>
           </a:p>
@@ -4287,7 +4341,7 @@
         </p:nvSpPr>
         <p:spPr>
           <a:xfrm>
-            <a:off x="5448274" y="5842901"/>
+            <a:off x="5425537" y="6016543"/>
             <a:ext cx="3484051" cy="1048900"/>
           </a:xfrm>
           <a:prstGeom prst="rect">
@@ -4325,7 +4379,7 @@
             </a:pPr>
             <a:r>
               <a:rPr lang="en-US" sz="1400" smtClean="0"/>
-              <a:t>Monte Carlo simulation</a:t>
+              <a:t>Coding in decisionSupport package</a:t>
             </a:r>
           </a:p>
           <a:p>
@@ -4335,7 +4389,7 @@
             </a:pPr>
             <a:r>
               <a:rPr lang="en-US" sz="1400" smtClean="0"/>
-              <a:t>Probability distribution</a:t>
+              <a:t>Monte Carlo simulation implemented</a:t>
             </a:r>
           </a:p>
           <a:p>
@@ -4345,7 +4399,7 @@
             </a:pPr>
             <a:r>
               <a:rPr lang="en-US" sz="1400" smtClean="0"/>
-              <a:t>Sensitivity analysis</a:t>
+              <a:t>Probability distribution generated</a:t>
             </a:r>
           </a:p>
           <a:p>
@@ -4355,7 +4409,17 @@
             </a:pPr>
             <a:r>
               <a:rPr lang="en-US" sz="1400" smtClean="0"/>
-              <a:t>Refining </a:t>
+              <a:t>Sensitivity analysis implemented</a:t>
+            </a:r>
+          </a:p>
+          <a:p>
+            <a:pPr marL="227013" indent="-227013">
+              <a:buFont typeface="Arial" panose="020B0604020202020204" pitchFamily="34" charset="0"/>
+              <a:buChar char="•"/>
+            </a:pPr>
+            <a:r>
+              <a:rPr lang="en-US" sz="1400" smtClean="0"/>
+              <a:t>Model refined, where possible</a:t>
             </a:r>
             <a:endParaRPr lang="en-US" sz="1400"/>
           </a:p>
@@ -4375,91 +4439,6 @@
               <a:buChar char="•"/>
             </a:pPr>
             <a:endParaRPr lang="en-US" sz="1000" kern="1200" dirty="0"/>
-          </a:p>
-        </p:txBody>
-      </p:sp>
-      <p:sp>
-        <p:nvSpPr>
-          <p:cNvPr id="46" name="Rectangle 45"/>
-          <p:cNvSpPr/>
-          <p:nvPr/>
-        </p:nvSpPr>
-        <p:spPr>
-          <a:xfrm>
-            <a:off x="2899111" y="6873183"/>
-            <a:ext cx="5924185" cy="943065"/>
-          </a:xfrm>
-          <a:prstGeom prst="rect">
-            <a:avLst/>
-          </a:prstGeom>
-          <a:solidFill>
-            <a:schemeClr val="bg2">
-              <a:lumMod val="90000"/>
-            </a:schemeClr>
-          </a:solidFill>
-        </p:spPr>
-        <p:style>
-          <a:lnRef idx="2">
-            <a:schemeClr val="accent1">
-              <a:shade val="50000"/>
-            </a:schemeClr>
-          </a:lnRef>
-          <a:fillRef idx="1">
-            <a:schemeClr val="accent1"/>
-          </a:fillRef>
-          <a:effectRef idx="0">
-            <a:schemeClr val="accent1"/>
-          </a:effectRef>
-          <a:fontRef idx="minor">
-            <a:schemeClr val="lt1"/>
-          </a:fontRef>
-        </p:style>
-        <p:txBody>
-          <a:bodyPr rtlCol="0" anchor="ctr"/>
-          <a:lstStyle/>
-          <a:p>
-            <a:pPr algn="ctr"/>
-            <a:endParaRPr lang="en-US"/>
-          </a:p>
-        </p:txBody>
-      </p:sp>
-      <p:sp>
-        <p:nvSpPr>
-          <p:cNvPr id="48" name="TextBox 47"/>
-          <p:cNvSpPr txBox="1"/>
-          <p:nvPr/>
-        </p:nvSpPr>
-        <p:spPr>
-          <a:xfrm>
-            <a:off x="2907442" y="7096776"/>
-            <a:ext cx="2132653" cy="646331"/>
-          </a:xfrm>
-          <a:prstGeom prst="rect">
-            <a:avLst/>
-          </a:prstGeom>
-          <a:solidFill>
-            <a:schemeClr val="accent6">
-              <a:lumMod val="60000"/>
-              <a:lumOff val="40000"/>
-            </a:schemeClr>
-          </a:solidFill>
-        </p:spPr>
-        <p:txBody>
-          <a:bodyPr wrap="square" rtlCol="0">
-            <a:spAutoFit/>
-          </a:bodyPr>
-          <a:lstStyle/>
-          <a:p>
-            <a:pPr algn="ctr"/>
-            <a:r>
-              <a:rPr lang="en-US" smtClean="0"/>
-              <a:t>7. </a:t>
-            </a:r>
-            <a:r>
-              <a:rPr lang="en-US" smtClean="0"/>
-              <a:t>Reflect method, recommendations</a:t>
-            </a:r>
-            <a:endParaRPr lang="en-US"/>
           </a:p>
         </p:txBody>
       </p:sp>
@@ -4511,94 +4490,6 @@
           </a:p>
         </p:txBody>
       </p:sp>
-      <p:sp>
-        <p:nvSpPr>
-          <p:cNvPr id="51" name="Rectangle 50"/>
-          <p:cNvSpPr/>
-          <p:nvPr/>
-        </p:nvSpPr>
-        <p:spPr>
-          <a:xfrm>
-            <a:off x="5448274" y="7160384"/>
-            <a:ext cx="3159960" cy="1048900"/>
-          </a:xfrm>
-          <a:prstGeom prst="rect">
-            <a:avLst/>
-          </a:prstGeom>
-        </p:spPr>
-        <p:style>
-          <a:lnRef idx="0">
-            <a:scrgbClr r="0" g="0" b="0"/>
-          </a:lnRef>
-          <a:fillRef idx="0">
-            <a:scrgbClr r="0" g="0" b="0"/>
-          </a:fillRef>
-          <a:effectRef idx="0">
-            <a:scrgbClr r="0" g="0" b="0"/>
-          </a:effectRef>
-          <a:fontRef idx="minor">
-            <a:schemeClr val="tx1">
-              <a:hueOff val="0"/>
-              <a:satOff val="0"/>
-              <a:lumOff val="0"/>
-              <a:alphaOff val="0"/>
-            </a:schemeClr>
-          </a:fontRef>
-        </p:style>
-        <p:txBody>
-          <a:bodyPr spcFirstLastPara="0" vert="horz" wrap="square" lIns="0" tIns="0" rIns="0" bIns="0" numCol="1" spcCol="1270" anchor="t" anchorCtr="0">
-            <a:noAutofit/>
-          </a:bodyPr>
-          <a:lstStyle/>
-          <a:p>
-            <a:pPr marL="227013" indent="-227013">
-              <a:buFont typeface="Arial" panose="020B0604020202020204" pitchFamily="34" charset="0"/>
-              <a:buChar char="•"/>
-            </a:pPr>
-            <a:r>
-              <a:rPr lang="en-US" sz="1400" smtClean="0"/>
-              <a:t>Reflect </a:t>
-            </a:r>
-            <a:r>
-              <a:rPr lang="en-US" sz="1400"/>
-              <a:t>about </a:t>
-            </a:r>
-            <a:r>
-              <a:rPr lang="en-US" sz="1400" smtClean="0"/>
-              <a:t>the approach</a:t>
-            </a:r>
-            <a:endParaRPr lang="en-US" sz="1400"/>
-          </a:p>
-          <a:p>
-            <a:pPr marL="227013" indent="-227013">
-              <a:buFont typeface="Arial" panose="020B0604020202020204" pitchFamily="34" charset="0"/>
-              <a:buChar char="•"/>
-            </a:pPr>
-            <a:r>
-              <a:rPr lang="en-US" sz="1400" smtClean="0"/>
-              <a:t>Recommendations </a:t>
-            </a:r>
-            <a:r>
-              <a:rPr lang="en-US" sz="1400" smtClean="0"/>
-              <a:t>for further actions</a:t>
-            </a:r>
-          </a:p>
-          <a:p>
-            <a:pPr marL="227013" indent="-227013">
-              <a:buFont typeface="Arial" panose="020B0604020202020204" pitchFamily="34" charset="0"/>
-              <a:buChar char="•"/>
-            </a:pPr>
-            <a:endParaRPr lang="en-US" sz="1400" smtClean="0"/>
-          </a:p>
-          <a:p>
-            <a:pPr marL="227013" indent="-227013">
-              <a:buFont typeface="Arial" panose="020B0604020202020204" pitchFamily="34" charset="0"/>
-              <a:buChar char="•"/>
-            </a:pPr>
-            <a:endParaRPr lang="en-US" sz="1000" kern="1200" dirty="0"/>
-          </a:p>
-        </p:txBody>
-      </p:sp>
       <p:cxnSp>
         <p:nvCxnSpPr>
           <p:cNvPr id="56" name="Straight Arrow Connector 55"/>
@@ -4607,7 +4498,7 @@
         </p:nvCxnSpPr>
         <p:spPr>
           <a:xfrm>
-            <a:off x="3973768" y="945787"/>
+            <a:off x="3973768" y="660037"/>
             <a:ext cx="7279" cy="501330"/>
           </a:xfrm>
           <a:prstGeom prst="straightConnector1">
@@ -4644,7 +4535,7 @@
         </p:nvCxnSpPr>
         <p:spPr>
           <a:xfrm>
-            <a:off x="3966489" y="2076181"/>
+            <a:off x="3966489" y="1819006"/>
             <a:ext cx="7279" cy="501330"/>
           </a:xfrm>
           <a:prstGeom prst="straightConnector1">
@@ -4680,9 +4571,9 @@
           <p:nvPr/>
         </p:nvCxnSpPr>
         <p:spPr>
-          <a:xfrm>
-            <a:off x="3959210" y="3216129"/>
-            <a:ext cx="7279" cy="501330"/>
+          <a:xfrm flipH="1">
+            <a:off x="3944652" y="3025629"/>
+            <a:ext cx="14558" cy="685275"/>
           </a:xfrm>
           <a:prstGeom prst="straightConnector1">
             <a:avLst/>
@@ -4784,43 +4675,6 @@
           </a:fontRef>
         </p:style>
       </p:cxnSp>
-      <p:cxnSp>
-        <p:nvCxnSpPr>
-          <p:cNvPr id="61" name="Straight Arrow Connector 60"/>
-          <p:cNvCxnSpPr/>
-          <p:nvPr/>
-        </p:nvCxnSpPr>
-        <p:spPr>
-          <a:xfrm>
-            <a:off x="3948291" y="6699685"/>
-            <a:ext cx="7279" cy="501330"/>
-          </a:xfrm>
-          <a:prstGeom prst="straightConnector1">
-            <a:avLst/>
-          </a:prstGeom>
-          <a:ln w="57150">
-            <a:solidFill>
-              <a:schemeClr val="accent6"/>
-            </a:solidFill>
-            <a:prstDash val="sysDot"/>
-            <a:tailEnd type="triangle"/>
-          </a:ln>
-        </p:spPr>
-        <p:style>
-          <a:lnRef idx="1">
-            <a:schemeClr val="accent1"/>
-          </a:lnRef>
-          <a:fillRef idx="0">
-            <a:schemeClr val="accent1"/>
-          </a:fillRef>
-          <a:effectRef idx="0">
-            <a:schemeClr val="accent1"/>
-          </a:effectRef>
-          <a:fontRef idx="minor">
-            <a:schemeClr val="tx1"/>
-          </a:fontRef>
-        </p:style>
-      </p:cxnSp>
       <p:sp>
         <p:nvSpPr>
           <p:cNvPr id="65" name="Rectangle 64"/>
@@ -4829,8 +4683,8 @@
         </p:nvSpPr>
         <p:spPr>
           <a:xfrm>
-            <a:off x="8863136" y="101416"/>
-            <a:ext cx="543499" cy="7692007"/>
+            <a:off x="9080006" y="-80155"/>
+            <a:ext cx="543499" cy="8077257"/>
           </a:xfrm>
           <a:prstGeom prst="rect">
             <a:avLst/>
@@ -4840,6 +4694,13 @@
               <a:lumMod val="90000"/>
             </a:schemeClr>
           </a:solidFill>
+          <a:ln>
+            <a:solidFill>
+              <a:schemeClr val="bg2">
+                <a:lumMod val="75000"/>
+              </a:schemeClr>
+            </a:solidFill>
+          </a:ln>
         </p:spPr>
         <p:style>
           <a:lnRef idx="2">
@@ -4874,8 +4735,8 @@
         </p:nvSpPr>
         <p:spPr>
           <a:xfrm rot="16200000">
-            <a:off x="6573229" y="4006293"/>
-            <a:ext cx="5110880" cy="461665"/>
+            <a:off x="5871859" y="3293940"/>
+            <a:ext cx="6874521" cy="461665"/>
           </a:xfrm>
           <a:prstGeom prst="rect">
             <a:avLst/>
@@ -4897,7 +4758,73 @@
                   </a:schemeClr>
                 </a:solidFill>
               </a:rPr>
-              <a:t>Intra- and inter- step iterative process</a:t>
+              <a:t>Iterative </a:t>
+            </a:r>
+            <a:r>
+              <a:rPr lang="en-US" sz="2400" b="1">
+                <a:solidFill>
+                  <a:schemeClr val="tx1">
+                    <a:lumMod val="65000"/>
+                    <a:lumOff val="35000"/>
+                  </a:schemeClr>
+                </a:solidFill>
+              </a:rPr>
+              <a:t>and </a:t>
+            </a:r>
+            <a:r>
+              <a:rPr lang="en-US" sz="2400" b="1">
+                <a:solidFill>
+                  <a:schemeClr val="tx1">
+                    <a:lumMod val="65000"/>
+                    <a:lumOff val="35000"/>
+                  </a:schemeClr>
+                </a:solidFill>
+              </a:rPr>
+              <a:t>reflextive </a:t>
+            </a:r>
+            <a:r>
+              <a:rPr lang="en-US" sz="2400" b="1">
+                <a:solidFill>
+                  <a:schemeClr val="tx1">
+                    <a:lumMod val="65000"/>
+                    <a:lumOff val="35000"/>
+                  </a:schemeClr>
+                </a:solidFill>
+              </a:rPr>
+              <a:t>i</a:t>
+            </a:r>
+            <a:r>
+              <a:rPr lang="en-US" sz="2400" b="1" smtClean="0">
+                <a:solidFill>
+                  <a:schemeClr val="tx1">
+                    <a:lumMod val="65000"/>
+                    <a:lumOff val="35000"/>
+                  </a:schemeClr>
+                </a:solidFill>
+              </a:rPr>
+              <a:t>ntra- </a:t>
+            </a:r>
+            <a:r>
+              <a:rPr lang="en-US" sz="2400" b="1" smtClean="0">
+                <a:solidFill>
+                  <a:schemeClr val="tx1">
+                    <a:lumMod val="65000"/>
+                    <a:lumOff val="35000"/>
+                  </a:schemeClr>
+                </a:solidFill>
+              </a:rPr>
+              <a:t>and inter- step </a:t>
+            </a:r>
+            <a:r>
+              <a:rPr lang="en-US" sz="2400" b="1" smtClean="0">
+                <a:solidFill>
+                  <a:schemeClr val="tx1">
+                    <a:lumMod val="65000"/>
+                    <a:lumOff val="35000"/>
+                  </a:schemeClr>
+                </a:solidFill>
+              </a:rPr>
+              <a:t>process</a:t>
             </a:r>
             <a:endParaRPr lang="en-US" sz="2400" b="1">
               <a:solidFill>
@@ -4993,6 +4920,351 @@
               <a:t>Refining model</a:t>
             </a:r>
             <a:endParaRPr lang="en-US" sz="2000" b="1"/>
+          </a:p>
+        </p:txBody>
+      </p:sp>
+      <p:sp>
+        <p:nvSpPr>
+          <p:cNvPr id="37" name="Rectangle 36"/>
+          <p:cNvSpPr/>
+          <p:nvPr/>
+        </p:nvSpPr>
+        <p:spPr>
+          <a:xfrm>
+            <a:off x="2264906" y="-675008"/>
+            <a:ext cx="3064517" cy="579507"/>
+          </a:xfrm>
+          <a:prstGeom prst="rect">
+            <a:avLst/>
+          </a:prstGeom>
+          <a:solidFill>
+            <a:schemeClr val="bg2">
+              <a:lumMod val="90000"/>
+            </a:schemeClr>
+          </a:solidFill>
+          <a:ln>
+            <a:solidFill>
+              <a:schemeClr val="bg2">
+                <a:lumMod val="90000"/>
+              </a:schemeClr>
+            </a:solidFill>
+          </a:ln>
+        </p:spPr>
+        <p:style>
+          <a:lnRef idx="2">
+            <a:schemeClr val="accent1">
+              <a:shade val="50000"/>
+            </a:schemeClr>
+          </a:lnRef>
+          <a:fillRef idx="1">
+            <a:schemeClr val="accent1"/>
+          </a:fillRef>
+          <a:effectRef idx="0">
+            <a:schemeClr val="accent1"/>
+          </a:effectRef>
+          <a:fontRef idx="minor">
+            <a:schemeClr val="lt1"/>
+          </a:fontRef>
+        </p:style>
+        <p:txBody>
+          <a:bodyPr rtlCol="0" anchor="ctr"/>
+          <a:lstStyle/>
+          <a:p>
+            <a:pPr algn="ctr"/>
+            <a:r>
+              <a:rPr lang="en-US" smtClean="0">
+                <a:solidFill>
+                  <a:schemeClr val="tx1"/>
+                </a:solidFill>
+              </a:rPr>
+              <a:t>Decision analysis step</a:t>
+            </a:r>
+            <a:endParaRPr lang="en-US">
+              <a:solidFill>
+                <a:schemeClr val="tx1"/>
+              </a:solidFill>
+            </a:endParaRPr>
+          </a:p>
+        </p:txBody>
+      </p:sp>
+      <p:sp>
+        <p:nvSpPr>
+          <p:cNvPr id="38" name="Rectangle 37"/>
+          <p:cNvSpPr/>
+          <p:nvPr/>
+        </p:nvSpPr>
+        <p:spPr>
+          <a:xfrm>
+            <a:off x="5329424" y="-677448"/>
+            <a:ext cx="4294081" cy="579507"/>
+          </a:xfrm>
+          <a:prstGeom prst="rect">
+            <a:avLst/>
+          </a:prstGeom>
+          <a:solidFill>
+            <a:schemeClr val="bg2">
+              <a:lumMod val="90000"/>
+            </a:schemeClr>
+          </a:solidFill>
+          <a:ln>
+            <a:solidFill>
+              <a:schemeClr val="bg2">
+                <a:lumMod val="90000"/>
+              </a:schemeClr>
+            </a:solidFill>
+          </a:ln>
+        </p:spPr>
+        <p:style>
+          <a:lnRef idx="2">
+            <a:schemeClr val="accent1">
+              <a:shade val="50000"/>
+            </a:schemeClr>
+          </a:lnRef>
+          <a:fillRef idx="1">
+            <a:schemeClr val="accent1"/>
+          </a:fillRef>
+          <a:effectRef idx="0">
+            <a:schemeClr val="accent1"/>
+          </a:effectRef>
+          <a:fontRef idx="minor">
+            <a:schemeClr val="lt1"/>
+          </a:fontRef>
+        </p:style>
+        <p:txBody>
+          <a:bodyPr rtlCol="0" anchor="ctr"/>
+          <a:lstStyle/>
+          <a:p>
+            <a:pPr marL="285750" indent="-285750">
+              <a:buFont typeface="Arial" panose="020B0604020202020204" pitchFamily="34" charset="0"/>
+              <a:buChar char="•"/>
+            </a:pPr>
+            <a:r>
+              <a:rPr lang="en-US" smtClean="0">
+                <a:solidFill>
+                  <a:schemeClr val="tx1"/>
+                </a:solidFill>
+              </a:rPr>
+              <a:t>Activity and expected output</a:t>
+            </a:r>
+            <a:endParaRPr lang="en-US">
+              <a:solidFill>
+                <a:schemeClr val="tx1"/>
+              </a:solidFill>
+            </a:endParaRPr>
+          </a:p>
+        </p:txBody>
+      </p:sp>
+      <p:sp>
+        <p:nvSpPr>
+          <p:cNvPr id="44" name="Rectangle 43"/>
+          <p:cNvSpPr/>
+          <p:nvPr/>
+        </p:nvSpPr>
+        <p:spPr>
+          <a:xfrm>
+            <a:off x="2892239" y="7070926"/>
+            <a:ext cx="6185234" cy="926176"/>
+          </a:xfrm>
+          <a:prstGeom prst="rect">
+            <a:avLst/>
+          </a:prstGeom>
+          <a:solidFill>
+            <a:schemeClr val="bg2">
+              <a:lumMod val="90000"/>
+            </a:schemeClr>
+          </a:solidFill>
+          <a:ln>
+            <a:solidFill>
+              <a:schemeClr val="bg2">
+                <a:lumMod val="75000"/>
+              </a:schemeClr>
+            </a:solidFill>
+          </a:ln>
+        </p:spPr>
+        <p:style>
+          <a:lnRef idx="2">
+            <a:schemeClr val="accent1">
+              <a:shade val="50000"/>
+            </a:schemeClr>
+          </a:lnRef>
+          <a:fillRef idx="1">
+            <a:schemeClr val="accent1"/>
+          </a:fillRef>
+          <a:effectRef idx="0">
+            <a:schemeClr val="accent1"/>
+          </a:effectRef>
+          <a:fontRef idx="minor">
+            <a:schemeClr val="lt1"/>
+          </a:fontRef>
+        </p:style>
+        <p:txBody>
+          <a:bodyPr rtlCol="0" anchor="ctr"/>
+          <a:lstStyle/>
+          <a:p>
+            <a:pPr algn="ctr"/>
+            <a:endParaRPr lang="en-US"/>
+          </a:p>
+        </p:txBody>
+      </p:sp>
+      <p:sp>
+        <p:nvSpPr>
+          <p:cNvPr id="45" name="TextBox 44"/>
+          <p:cNvSpPr txBox="1"/>
+          <p:nvPr/>
+        </p:nvSpPr>
+        <p:spPr>
+          <a:xfrm>
+            <a:off x="2929458" y="7242022"/>
+            <a:ext cx="2132653" cy="646331"/>
+          </a:xfrm>
+          <a:prstGeom prst="rect">
+            <a:avLst/>
+          </a:prstGeom>
+          <a:solidFill>
+            <a:schemeClr val="accent6">
+              <a:lumMod val="60000"/>
+              <a:lumOff val="40000"/>
+            </a:schemeClr>
+          </a:solidFill>
+        </p:spPr>
+        <p:txBody>
+          <a:bodyPr wrap="square" rtlCol="0">
+            <a:spAutoFit/>
+          </a:bodyPr>
+          <a:lstStyle/>
+          <a:p>
+            <a:pPr algn="ctr"/>
+            <a:r>
+              <a:rPr lang="en-US"/>
+              <a:t>7</a:t>
+            </a:r>
+            <a:r>
+              <a:rPr lang="en-US" smtClean="0"/>
+              <a:t>. Share results, receive feedback</a:t>
+            </a:r>
+            <a:endParaRPr lang="en-US"/>
+          </a:p>
+        </p:txBody>
+      </p:sp>
+      <p:cxnSp>
+        <p:nvCxnSpPr>
+          <p:cNvPr id="41" name="Straight Arrow Connector 40"/>
+          <p:cNvCxnSpPr/>
+          <p:nvPr/>
+        </p:nvCxnSpPr>
+        <p:spPr>
+          <a:xfrm>
+            <a:off x="3937373" y="6730129"/>
+            <a:ext cx="7279" cy="501330"/>
+          </a:xfrm>
+          <a:prstGeom prst="straightConnector1">
+            <a:avLst/>
+          </a:prstGeom>
+          <a:ln w="57150">
+            <a:solidFill>
+              <a:schemeClr val="accent6"/>
+            </a:solidFill>
+            <a:prstDash val="sysDot"/>
+            <a:tailEnd type="triangle"/>
+          </a:ln>
+        </p:spPr>
+        <p:style>
+          <a:lnRef idx="1">
+            <a:schemeClr val="accent1"/>
+          </a:lnRef>
+          <a:fillRef idx="0">
+            <a:schemeClr val="accent1"/>
+          </a:fillRef>
+          <a:effectRef idx="0">
+            <a:schemeClr val="accent1"/>
+          </a:effectRef>
+          <a:fontRef idx="minor">
+            <a:schemeClr val="tx1"/>
+          </a:fontRef>
+        </p:style>
+      </p:cxnSp>
+      <p:sp>
+        <p:nvSpPr>
+          <p:cNvPr id="47" name="Rectangle 46"/>
+          <p:cNvSpPr/>
+          <p:nvPr/>
+        </p:nvSpPr>
+        <p:spPr>
+          <a:xfrm>
+            <a:off x="5402801" y="7307821"/>
+            <a:ext cx="3484051" cy="599638"/>
+          </a:xfrm>
+          <a:prstGeom prst="rect">
+            <a:avLst/>
+          </a:prstGeom>
+        </p:spPr>
+        <p:style>
+          <a:lnRef idx="0">
+            <a:scrgbClr r="0" g="0" b="0"/>
+          </a:lnRef>
+          <a:fillRef idx="0">
+            <a:scrgbClr r="0" g="0" b="0"/>
+          </a:fillRef>
+          <a:effectRef idx="0">
+            <a:scrgbClr r="0" g="0" b="0"/>
+          </a:effectRef>
+          <a:fontRef idx="minor">
+            <a:schemeClr val="tx1">
+              <a:hueOff val="0"/>
+              <a:satOff val="0"/>
+              <a:lumOff val="0"/>
+              <a:alphaOff val="0"/>
+            </a:schemeClr>
+          </a:fontRef>
+        </p:style>
+        <p:txBody>
+          <a:bodyPr spcFirstLastPara="0" vert="horz" wrap="square" lIns="0" tIns="0" rIns="0" bIns="0" numCol="1" spcCol="1270" anchor="t" anchorCtr="0">
+            <a:noAutofit/>
+          </a:bodyPr>
+          <a:lstStyle/>
+          <a:p>
+            <a:pPr marL="227013" indent="-227013">
+              <a:buFont typeface="Arial" panose="020B0604020202020204" pitchFamily="34" charset="0"/>
+              <a:buChar char="•"/>
+            </a:pPr>
+            <a:r>
+              <a:rPr lang="en-US" sz="1400" smtClean="0"/>
+              <a:t>Talk, workshop, personal exchange</a:t>
+            </a:r>
+          </a:p>
+          <a:p>
+            <a:pPr marL="227013" indent="-227013">
+              <a:buFont typeface="Arial" panose="020B0604020202020204" pitchFamily="34" charset="0"/>
+              <a:buChar char="•"/>
+            </a:pPr>
+            <a:r>
+              <a:rPr lang="en-US" sz="1400" smtClean="0"/>
+              <a:t>Model updated, if needed</a:t>
+            </a:r>
+          </a:p>
+          <a:p>
+            <a:pPr marL="227013" indent="-227013">
+              <a:buFont typeface="Arial" panose="020B0604020202020204" pitchFamily="34" charset="0"/>
+              <a:buChar char="•"/>
+            </a:pPr>
+            <a:endParaRPr lang="en-US" sz="1400" smtClean="0"/>
+          </a:p>
+          <a:p>
+            <a:pPr marL="227013" indent="-227013">
+              <a:buFont typeface="Arial" panose="020B0604020202020204" pitchFamily="34" charset="0"/>
+              <a:buChar char="•"/>
+            </a:pPr>
+            <a:endParaRPr lang="en-US" sz="1400" smtClean="0"/>
+          </a:p>
+          <a:p>
+            <a:endParaRPr lang="en-US" sz="1400" smtClean="0"/>
+          </a:p>
+          <a:p>
+            <a:pPr marL="227013" indent="-227013">
+              <a:buFont typeface="Arial" panose="020B0604020202020204" pitchFamily="34" charset="0"/>
+              <a:buChar char="•"/>
+            </a:pPr>
+            <a:endParaRPr lang="en-US" sz="1000" kern="1200" dirty="0"/>
           </a:p>
         </p:txBody>
       </p:sp>

</xml_diff>